<commit_message>
Add readme.  Updated powerpoint and reran the rmarkdown to generate .html file.
</commit_message>
<xml_diff>
--- a/Introduction to Computational Flow Cytometry in R.pptx
+++ b/Introduction to Computational Flow Cytometry in R.pptx
@@ -214,7 +214,7 @@
             </a:lvl1pPr>
           </a:lstStyle>
           <a:p>
-            <a:endParaRPr lang="en-US"/>
+            <a:endParaRPr lang="en-US" dirty="0"/>
           </a:p>
         </p:txBody>
       </p:sp>
@@ -247,9 +247,9 @@
           <a:p>
             <a:fld id="{20985C1D-71CD-40A7-90E6-2A509741901C}" type="datetimeFigureOut">
               <a:rPr lang="en-US" smtClean="0"/>
-              <a:t>3/4/2024</a:t>
+              <a:t>3/13/2024</a:t>
             </a:fld>
-            <a:endParaRPr lang="en-US"/>
+            <a:endParaRPr lang="en-US" dirty="0"/>
           </a:p>
         </p:txBody>
       </p:sp>
@@ -280,7 +280,7 @@
             </a:lvl1pPr>
           </a:lstStyle>
           <a:p>
-            <a:endParaRPr lang="en-US"/>
+            <a:endParaRPr lang="en-US" dirty="0"/>
           </a:p>
         </p:txBody>
       </p:sp>
@@ -315,7 +315,7 @@
               <a:rPr lang="en-US" smtClean="0"/>
               <a:t>‹#›</a:t>
             </a:fld>
-            <a:endParaRPr lang="en-US"/>
+            <a:endParaRPr lang="en-US" dirty="0"/>
           </a:p>
         </p:txBody>
       </p:sp>
@@ -379,7 +379,7 @@
             </a:lvl1pPr>
           </a:lstStyle>
           <a:p>
-            <a:endParaRPr lang="en-US"/>
+            <a:endParaRPr lang="en-US" dirty="0"/>
           </a:p>
         </p:txBody>
       </p:sp>
@@ -413,9 +413,9 @@
             <a:fld id="{D39D1713-3CF6-4469-9746-34AB3FADFE84}" type="datetimeFigureOut">
               <a:rPr lang="en-US" smtClean="0"/>
               <a:pPr/>
-              <a:t>3/4/2024</a:t>
+              <a:t>3/13/2024</a:t>
             </a:fld>
-            <a:endParaRPr lang="en-US"/>
+            <a:endParaRPr lang="en-US" dirty="0"/>
           </a:p>
         </p:txBody>
       </p:sp>
@@ -448,7 +448,7 @@
           <a:bodyPr vert="horz" lIns="91440" tIns="45720" rIns="91440" bIns="45720" rtlCol="0" anchor="ctr"/>
           <a:lstStyle/>
           <a:p>
-            <a:endParaRPr lang="en-US"/>
+            <a:endParaRPr lang="en-US" dirty="0"/>
           </a:p>
         </p:txBody>
       </p:sp>
@@ -540,7 +540,7 @@
             </a:lvl1pPr>
           </a:lstStyle>
           <a:p>
-            <a:endParaRPr lang="en-US"/>
+            <a:endParaRPr lang="en-US" dirty="0"/>
           </a:p>
         </p:txBody>
       </p:sp>
@@ -576,7 +576,7 @@
               <a:pPr/>
               <a:t>‹#›</a:t>
             </a:fld>
-            <a:endParaRPr lang="en-US"/>
+            <a:endParaRPr lang="en-US" dirty="0"/>
           </a:p>
         </p:txBody>
       </p:sp>
@@ -1362,7 +1362,7 @@
               <a:pPr/>
               <a:t>‹#›</a:t>
             </a:fld>
-            <a:endParaRPr lang="en-US"/>
+            <a:endParaRPr lang="en-US" dirty="0"/>
           </a:p>
         </p:txBody>
       </p:sp>
@@ -1411,7 +1411,7 @@
               <a:pPr/>
               <a:t>‹#›</a:t>
             </a:fld>
-            <a:endParaRPr lang="en-US"/>
+            <a:endParaRPr lang="en-US" dirty="0"/>
           </a:p>
         </p:txBody>
       </p:sp>
@@ -1803,7 +1803,7 @@
               <a:pPr/>
               <a:t>‹#›</a:t>
             </a:fld>
-            <a:endParaRPr lang="en-US"/>
+            <a:endParaRPr lang="en-US" dirty="0"/>
           </a:p>
         </p:txBody>
       </p:sp>
@@ -2142,7 +2142,7 @@
               <a:pPr/>
               <a:t>‹#›</a:t>
             </a:fld>
-            <a:endParaRPr lang="en-US"/>
+            <a:endParaRPr lang="en-US" dirty="0"/>
           </a:p>
         </p:txBody>
       </p:sp>
@@ -2251,7 +2251,7 @@
               <a:pPr/>
               <a:t>‹#›</a:t>
             </a:fld>
-            <a:endParaRPr lang="en-US"/>
+            <a:endParaRPr lang="en-US" dirty="0"/>
           </a:p>
         </p:txBody>
       </p:sp>
@@ -2710,7 +2710,7 @@
               <a:pPr/>
               <a:t>‹#›</a:t>
             </a:fld>
-            <a:endParaRPr lang="en-US"/>
+            <a:endParaRPr lang="en-US" dirty="0"/>
           </a:p>
         </p:txBody>
       </p:sp>
@@ -3485,22 +3485,13 @@
           <a:p>
             <a:pPr algn="l"/>
             <a:r>
-              <a:rPr lang="en-US" sz="675" dirty="0" err="1">
-                <a:solidFill>
-                  <a:srgbClr val="000000"/>
-                </a:solidFill>
-                <a:latin typeface="Segoe UI" panose="020B0502040204020203" pitchFamily="34" charset="0"/>
-              </a:rPr>
-              <a:t>Schmit</a:t>
-            </a:r>
-            <a:r>
               <a:rPr lang="en-US" sz="675" dirty="0">
                 <a:solidFill>
                   <a:srgbClr val="000000"/>
                 </a:solidFill>
                 <a:latin typeface="Segoe UI" panose="020B0502040204020203" pitchFamily="34" charset="0"/>
               </a:rPr>
-              <a:t>, T., Klomp, M. and Khan, M. (2020) "An Overview of Flow Cytometry: Its Principles and Applications in Allergic Disease Research", </a:t>
+              <a:t>Schmit, T., Klomp, M. and Khan, M. (2020) "An Overview of Flow Cytometry: Its Principles and Applications in Allergic Disease Research", </a:t>
             </a:r>
             <a:r>
               <a:rPr lang="en-US" sz="675" i="1" dirty="0">
@@ -3518,25 +3509,7 @@
                 </a:solidFill>
                 <a:latin typeface="Segoe UI" panose="020B0502040204020203" pitchFamily="34" charset="0"/>
               </a:rPr>
-              <a:t>, pp. 169-182. </a:t>
-            </a:r>
-            <a:r>
-              <a:rPr lang="en-US" sz="675" dirty="0" err="1">
-                <a:solidFill>
-                  <a:srgbClr val="000000"/>
-                </a:solidFill>
-                <a:latin typeface="Segoe UI" panose="020B0502040204020203" pitchFamily="34" charset="0"/>
-              </a:rPr>
-              <a:t>doi</a:t>
-            </a:r>
-            <a:r>
-              <a:rPr lang="en-US" sz="675" dirty="0">
-                <a:solidFill>
-                  <a:srgbClr val="000000"/>
-                </a:solidFill>
-                <a:latin typeface="Segoe UI" panose="020B0502040204020203" pitchFamily="34" charset="0"/>
-              </a:rPr>
-              <a:t>: 10.1007/978-1-0716-1001-5_13.</a:t>
+              <a:t>, pp. 169-182. doi: 10.1007/978-1-0716-1001-5_13.</a:t>
             </a:r>
           </a:p>
           <a:p>
@@ -4013,31 +3986,13 @@
           <a:p>
             <a:pPr algn="l"/>
             <a:r>
-              <a:rPr lang="en-US" sz="788" i="1" dirty="0" err="1">
-                <a:solidFill>
-                  <a:srgbClr val="000000"/>
-                </a:solidFill>
-                <a:latin typeface="Segoe UI" panose="020B0502040204020203" pitchFamily="34" charset="0"/>
-              </a:rPr>
-              <a:t>ggcyto</a:t>
-            </a:r>
-            <a:r>
               <a:rPr lang="en-US" sz="788" i="1" dirty="0">
                 <a:solidFill>
                   <a:srgbClr val="000000"/>
                 </a:solidFill>
                 <a:latin typeface="Segoe UI" panose="020B0502040204020203" pitchFamily="34" charset="0"/>
               </a:rPr>
-              <a:t> : Visualize Cytometry data with </a:t>
-            </a:r>
-            <a:r>
-              <a:rPr lang="en-US" sz="788" i="1" dirty="0" err="1">
-                <a:solidFill>
-                  <a:srgbClr val="000000"/>
-                </a:solidFill>
-                <a:latin typeface="Segoe UI" panose="020B0502040204020203" pitchFamily="34" charset="0"/>
-              </a:rPr>
-              <a:t>ggplot</a:t>
+              <a:t>ggcyto : Visualize Cytometry data with ggplot</a:t>
             </a:r>
             <a:r>
               <a:rPr lang="en-US" sz="788" dirty="0">
@@ -4069,22 +4024,13 @@
               <a:t>Jiang, M. (2023) </a:t>
             </a:r>
             <a:r>
-              <a:rPr lang="en-US" sz="788" i="1" dirty="0" err="1">
-                <a:solidFill>
-                  <a:srgbClr val="000000"/>
-                </a:solidFill>
-                <a:latin typeface="Segoe UI" panose="020B0502040204020203" pitchFamily="34" charset="0"/>
-              </a:rPr>
-              <a:t>OpenCyto</a:t>
-            </a:r>
-            <a:r>
               <a:rPr lang="en-US" sz="788" i="1" dirty="0">
                 <a:solidFill>
                   <a:srgbClr val="000000"/>
                 </a:solidFill>
                 <a:latin typeface="Segoe UI" panose="020B0502040204020203" pitchFamily="34" charset="0"/>
               </a:rPr>
-              <a:t>: How to use different auto gating functions</a:t>
+              <a:t>OpenCyto: How to use different auto gating functions</a:t>
             </a:r>
             <a:r>
               <a:rPr lang="en-US" sz="788" dirty="0">
@@ -4362,32 +4308,16 @@
           <a:p>
             <a:r>
               <a:rPr lang="en-US" sz="2000" dirty="0"/>
-              <a:t>Mean </a:t>
-            </a:r>
-            <a:r>
-              <a:rPr lang="en-US" sz="2000" dirty="0" err="1"/>
-              <a:t>Flourescence</a:t>
-            </a:r>
+              <a:t>Mean Fluorescence Intensity (MFI)</a:t>
+            </a:r>
+          </a:p>
+          <a:p>
+            <a:endParaRPr lang="en-US" sz="2000" dirty="0"/>
+          </a:p>
+          <a:p>
             <a:r>
               <a:rPr lang="en-US" sz="2000" dirty="0"/>
-              <a:t> Intensity (MFI)</a:t>
-            </a:r>
-          </a:p>
-          <a:p>
-            <a:endParaRPr lang="en-US" sz="2000" dirty="0"/>
-          </a:p>
-          <a:p>
-            <a:r>
-              <a:rPr lang="en-US" sz="2000" dirty="0"/>
-              <a:t>Median </a:t>
-            </a:r>
-            <a:r>
-              <a:rPr lang="en-US" sz="2000" dirty="0" err="1"/>
-              <a:t>Flourescence</a:t>
-            </a:r>
-            <a:r>
-              <a:rPr lang="en-US" sz="2000" dirty="0"/>
-              <a:t> Intensity</a:t>
+              <a:t>Median Fluorescence Intensity</a:t>
             </a:r>
           </a:p>
         </p:txBody>
@@ -4476,25 +4406,7 @@
                 </a:solidFill>
                 <a:latin typeface="Segoe UI" panose="020B0502040204020203" pitchFamily="34" charset="0"/>
               </a:rPr>
-              <a:t>, 52(31), pp. 5402-5405. </a:t>
-            </a:r>
-            <a:r>
-              <a:rPr lang="en-US" sz="1050" dirty="0" err="1">
-                <a:solidFill>
-                  <a:srgbClr val="000000"/>
-                </a:solidFill>
-                <a:latin typeface="Segoe UI" panose="020B0502040204020203" pitchFamily="34" charset="0"/>
-              </a:rPr>
-              <a:t>doi</a:t>
-            </a:r>
-            <a:r>
-              <a:rPr lang="en-US" sz="1050" dirty="0">
-                <a:solidFill>
-                  <a:srgbClr val="000000"/>
-                </a:solidFill>
-                <a:latin typeface="Segoe UI" panose="020B0502040204020203" pitchFamily="34" charset="0"/>
-              </a:rPr>
-              <a:t>: 10.1039/c6cc01048b.</a:t>
+              <a:t>, 52(31), pp. 5402-5405. doi: 10.1039/c6cc01048b.</a:t>
             </a:r>
           </a:p>
         </p:txBody>
@@ -4581,12 +4493,8 @@
           <a:lstStyle/>
           <a:p>
             <a:r>
-              <a:rPr lang="en-US" dirty="0" err="1"/>
-              <a:t>flowCore</a:t>
-            </a:r>
-            <a:r>
               <a:rPr lang="en-US" dirty="0"/>
-              <a:t>: core analysis functions</a:t>
+              <a:t>flowCore: core analysis functions</a:t>
             </a:r>
           </a:p>
           <a:p>
@@ -4601,12 +4509,8 @@
           </a:p>
           <a:p>
             <a:r>
-              <a:rPr lang="en-US" dirty="0" err="1"/>
-              <a:t>ggcyto</a:t>
-            </a:r>
-            <a:r>
               <a:rPr lang="en-US" dirty="0"/>
-              <a:t>: visualization</a:t>
+              <a:t>ggcyto: visualization</a:t>
             </a:r>
           </a:p>
           <a:p>
@@ -4621,12 +4525,8 @@
           </a:p>
           <a:p>
             <a:r>
-              <a:rPr lang="en-US" dirty="0" err="1"/>
-              <a:t>flowAI</a:t>
-            </a:r>
-            <a:r>
               <a:rPr lang="en-US" dirty="0"/>
-              <a:t>: data QC</a:t>
+              <a:t>flowAI: data QC</a:t>
             </a:r>
           </a:p>
           <a:p>
@@ -4641,12 +4541,8 @@
           </a:p>
           <a:p>
             <a:r>
-              <a:rPr lang="en-US" dirty="0" err="1"/>
-              <a:t>openCyto</a:t>
-            </a:r>
-            <a:r>
               <a:rPr lang="en-US" dirty="0"/>
-              <a:t>: automated gating</a:t>
+              <a:t>openCyto: automated gating</a:t>
             </a:r>
           </a:p>
           <a:p>
@@ -4755,12 +4651,8 @@
           <a:p>
             <a:pPr lvl="1"/>
             <a:r>
-              <a:rPr lang="en-US" dirty="0" err="1"/>
-              <a:t>Rstudio</a:t>
-            </a:r>
-            <a:r>
               <a:rPr lang="en-US" dirty="0"/>
-              <a:t> (</a:t>
+              <a:t>Rstudio (</a:t>
             </a:r>
             <a:r>
               <a:rPr lang="en-US" dirty="0">
@@ -4789,15 +4681,7 @@
           <a:p>
             <a:r>
               <a:rPr lang="en-US" dirty="0"/>
-              <a:t>If within NIAID, consider self-service for R and </a:t>
-            </a:r>
-            <a:r>
-              <a:rPr lang="en-US" dirty="0" err="1"/>
-              <a:t>Rstudio</a:t>
-            </a:r>
-            <a:r>
-              <a:rPr lang="en-US" dirty="0"/>
-              <a:t> install:</a:t>
+              <a:t>If within NIAID, consider self-service for R and Rstudio install:</a:t>
             </a:r>
           </a:p>
           <a:p>
@@ -4865,7 +4749,7 @@
               <a:pPr/>
               <a:t>14</a:t>
             </a:fld>
-            <a:endParaRPr lang="en-US"/>
+            <a:endParaRPr lang="en-US" dirty="0"/>
           </a:p>
         </p:txBody>
       </p:sp>
@@ -5001,15 +4885,7 @@
             <a:pPr lvl="1"/>
             <a:r>
               <a:rPr lang="en-US" dirty="0"/>
-              <a:t>Within NIH, you can use the </a:t>
-            </a:r>
-            <a:r>
-              <a:rPr lang="en-US" dirty="0" err="1"/>
-              <a:t>Biowulf</a:t>
-            </a:r>
-            <a:r>
-              <a:rPr lang="en-US" dirty="0"/>
-              <a:t> HPC cluster: </a:t>
+              <a:t>Within NIH, you can use the Biowulf HPC cluster: </a:t>
             </a:r>
             <a:r>
               <a:rPr lang="en-US" dirty="0">
@@ -5022,15 +4898,7 @@
           <a:p>
             <a:r>
               <a:rPr lang="en-US" dirty="0"/>
-              <a:t>Download and install R and </a:t>
-            </a:r>
-            <a:r>
-              <a:rPr lang="en-US" dirty="0" err="1"/>
-              <a:t>Rstudio</a:t>
-            </a:r>
-            <a:r>
-              <a:rPr lang="en-US" dirty="0"/>
-              <a:t>:</a:t>
+              <a:t>Download and install R and Rstudio:</a:t>
             </a:r>
           </a:p>
           <a:p>
@@ -5050,12 +4918,8 @@
           <a:p>
             <a:pPr lvl="1"/>
             <a:r>
-              <a:rPr lang="en-US" dirty="0" err="1"/>
-              <a:t>Rstudio</a:t>
-            </a:r>
-            <a:r>
               <a:rPr lang="en-US" dirty="0"/>
-              <a:t>: </a:t>
+              <a:t>Rstudio: </a:t>
             </a:r>
             <a:r>
               <a:rPr lang="en-US" dirty="0">
@@ -5151,16 +5015,51 @@
               <a:pPr/>
               <a:t>16</a:t>
             </a:fld>
-            <a:endParaRPr lang="en-US"/>
+            <a:endParaRPr lang="en-US" dirty="0"/>
+          </a:p>
+        </p:txBody>
+      </p:sp>
+      <p:sp>
+        <p:nvSpPr>
+          <p:cNvPr id="8" name="TextBox 7">
+            <a:extLst>
+              <a:ext uri="{FF2B5EF4-FFF2-40B4-BE49-F238E27FC236}">
+                <a16:creationId xmlns:a16="http://schemas.microsoft.com/office/drawing/2014/main" id="{549524C8-2C71-470E-BE5D-B73ACD40211C}"/>
+              </a:ext>
+            </a:extLst>
+          </p:cNvPr>
+          <p:cNvSpPr txBox="1"/>
+          <p:nvPr/>
+        </p:nvSpPr>
+        <p:spPr>
+          <a:xfrm>
+            <a:off x="2647950" y="4589003"/>
+            <a:ext cx="5629064" cy="369332"/>
+          </a:xfrm>
+          <a:prstGeom prst="rect">
+            <a:avLst/>
+          </a:prstGeom>
+          <a:noFill/>
+        </p:spPr>
+        <p:txBody>
+          <a:bodyPr wrap="square">
+            <a:spAutoFit/>
+          </a:bodyPr>
+          <a:lstStyle/>
+          <a:p>
+            <a:r>
+              <a:rPr lang="en-US" dirty="0"/>
+              <a:t>https://github.com/niaid/computational.flow.cytometry</a:t>
+            </a:r>
           </a:p>
         </p:txBody>
       </p:sp>
       <p:pic>
         <p:nvPicPr>
-          <p:cNvPr id="6" name="Picture 5">
+          <p:cNvPr id="5" name="Picture 4">
             <a:extLst>
               <a:ext uri="{FF2B5EF4-FFF2-40B4-BE49-F238E27FC236}">
-                <a16:creationId xmlns:a16="http://schemas.microsoft.com/office/drawing/2014/main" id="{9D888322-3B3C-49A8-9C44-53DB16250771}"/>
+                <a16:creationId xmlns:a16="http://schemas.microsoft.com/office/drawing/2014/main" id="{B4481794-0823-3382-6A22-37BB38879BE8}"/>
               </a:ext>
             </a:extLst>
           </p:cNvPr>
@@ -5177,49 +5076,14 @@
         </p:blipFill>
         <p:spPr>
           <a:xfrm>
-            <a:off x="548640" y="974356"/>
-            <a:ext cx="7193281" cy="3512124"/>
+            <a:off x="1067101" y="1113536"/>
+            <a:ext cx="4990228" cy="2937764"/>
           </a:xfrm>
           <a:prstGeom prst="rect">
             <a:avLst/>
           </a:prstGeom>
         </p:spPr>
       </p:pic>
-      <p:sp>
-        <p:nvSpPr>
-          <p:cNvPr id="8" name="TextBox 7">
-            <a:extLst>
-              <a:ext uri="{FF2B5EF4-FFF2-40B4-BE49-F238E27FC236}">
-                <a16:creationId xmlns:a16="http://schemas.microsoft.com/office/drawing/2014/main" id="{549524C8-2C71-470E-BE5D-B73ACD40211C}"/>
-              </a:ext>
-            </a:extLst>
-          </p:cNvPr>
-          <p:cNvSpPr txBox="1"/>
-          <p:nvPr/>
-        </p:nvSpPr>
-        <p:spPr>
-          <a:xfrm>
-            <a:off x="3427308" y="4589003"/>
-            <a:ext cx="4849706" cy="369332"/>
-          </a:xfrm>
-          <a:prstGeom prst="rect">
-            <a:avLst/>
-          </a:prstGeom>
-          <a:noFill/>
-        </p:spPr>
-        <p:txBody>
-          <a:bodyPr wrap="square">
-            <a:spAutoFit/>
-          </a:bodyPr>
-          <a:lstStyle/>
-          <a:p>
-            <a:r>
-              <a:rPr lang="en-US" dirty="0"/>
-              <a:t>https://github.com/niaid/Data-Science-with-R</a:t>
-            </a:r>
-          </a:p>
-        </p:txBody>
-      </p:sp>
       <p:sp>
         <p:nvSpPr>
           <p:cNvPr id="9" name="Rectangle 8">
@@ -5234,7 +5098,7 @@
         </p:nvSpPr>
         <p:spPr>
           <a:xfrm>
-            <a:off x="3705014" y="2898988"/>
+            <a:off x="4035214" y="3324438"/>
             <a:ext cx="819574" cy="311573"/>
           </a:xfrm>
           <a:prstGeom prst="rect">
@@ -5263,7 +5127,7 @@
           <a:lstStyle/>
           <a:p>
             <a:pPr algn="ctr"/>
-            <a:endParaRPr lang="en-US"/>
+            <a:endParaRPr lang="en-US" dirty="0"/>
           </a:p>
         </p:txBody>
       </p:sp>
@@ -5357,40 +5221,16 @@
           <a:p>
             <a:r>
               <a:rPr lang="en-US" dirty="0"/>
-              <a:t>Open the subfolder “</a:t>
-            </a:r>
-            <a:r>
-              <a:rPr lang="en-US" dirty="0" err="1"/>
-              <a:t>intro_programming_r</a:t>
-            </a:r>
+              <a:t>Open the “computational_flow_cytometry.Rproj” file</a:t>
+            </a:r>
+          </a:p>
+          <a:p>
+            <a:endParaRPr lang="en-US" dirty="0"/>
+          </a:p>
+          <a:p>
             <a:r>
               <a:rPr lang="en-US" dirty="0"/>
-              <a:t>” and then the “</a:t>
-            </a:r>
-            <a:r>
-              <a:rPr lang="en-US" dirty="0" err="1"/>
-              <a:t>intro_programming_r.Rproj</a:t>
-            </a:r>
-            <a:r>
-              <a:rPr lang="en-US" dirty="0"/>
-              <a:t>” file</a:t>
-            </a:r>
-          </a:p>
-          <a:p>
-            <a:endParaRPr lang="en-US" dirty="0"/>
-          </a:p>
-          <a:p>
-            <a:r>
-              <a:rPr lang="en-US" dirty="0"/>
-              <a:t>If </a:t>
-            </a:r>
-            <a:r>
-              <a:rPr lang="en-US" dirty="0" err="1"/>
-              <a:t>Rstudio</a:t>
-            </a:r>
-            <a:r>
-              <a:rPr lang="en-US" dirty="0"/>
-              <a:t> is installed, then this should open the project in RStudio</a:t>
+              <a:t>If Rstudio is installed, then this should open the project in RStudio</a:t>
             </a:r>
           </a:p>
         </p:txBody>
@@ -5421,7 +5261,7 @@
               <a:pPr/>
               <a:t>17</a:t>
             </a:fld>
-            <a:endParaRPr lang="en-US"/>
+            <a:endParaRPr lang="en-US" dirty="0"/>
           </a:p>
         </p:txBody>
       </p:sp>
@@ -5502,7 +5342,7 @@
         <p:spPr/>
         <p:txBody>
           <a:bodyPr>
-            <a:normAutofit fontScale="70000" lnSpcReduction="20000"/>
+            <a:normAutofit fontScale="85000" lnSpcReduction="20000"/>
           </a:bodyPr>
           <a:lstStyle/>
           <a:p>
@@ -5517,80 +5357,33 @@
           <a:p>
             <a:r>
               <a:rPr lang="en-US" dirty="0"/>
-              <a:t>In the </a:t>
-            </a:r>
-            <a:r>
-              <a:rPr lang="en-US" dirty="0" err="1"/>
-              <a:t>Rstudio</a:t>
-            </a:r>
+              <a:t>In the Rstudio console (bottom left tab), add the following code below and then hit enter:</a:t>
+            </a:r>
+          </a:p>
+          <a:p>
+            <a:pPr lvl="1"/>
             <a:r>
               <a:rPr lang="en-US" dirty="0"/>
-              <a:t> console (bottom left tab), add the following code below and then hit enter:</a:t>
+              <a:t>source(“installation.R”)</a:t>
+            </a:r>
+          </a:p>
+          <a:p>
+            <a:pPr marL="228600" lvl="1" indent="0">
+              <a:buNone/>
+            </a:pPr>
+            <a:endParaRPr lang="en-US" dirty="0"/>
+          </a:p>
+          <a:p>
+            <a:r>
+              <a:rPr lang="en-US" dirty="0"/>
+              <a:t>Open the “computational_flow_cytometry.R” file, which should pop up in the upper left quadrant of Rstudio</a:t>
             </a:r>
           </a:p>
           <a:p>
             <a:pPr lvl="1"/>
             <a:r>
-              <a:rPr lang="en-US" dirty="0" err="1"/>
-              <a:t>install.packages</a:t>
-            </a:r>
-            <a:r>
               <a:rPr lang="en-US" dirty="0"/>
-              <a:t>(“</a:t>
-            </a:r>
-            <a:r>
-              <a:rPr lang="en-US" dirty="0" err="1"/>
-              <a:t>renv</a:t>
-            </a:r>
-            <a:r>
-              <a:rPr lang="en-US" dirty="0"/>
-              <a:t>”)</a:t>
-            </a:r>
-          </a:p>
-          <a:p>
-            <a:pPr lvl="1"/>
-            <a:endParaRPr lang="en-US" dirty="0"/>
-          </a:p>
-          <a:p>
-            <a:r>
-              <a:rPr lang="en-US" dirty="0"/>
-              <a:t>Now add the following code to the console and hit enter after each:</a:t>
-            </a:r>
-          </a:p>
-          <a:p>
-            <a:pPr lvl="1"/>
-            <a:r>
-              <a:rPr lang="en-US" dirty="0" err="1"/>
-              <a:t>renv</a:t>
-            </a:r>
-            <a:r>
-              <a:rPr lang="en-US" dirty="0"/>
-              <a:t>::restore()</a:t>
-            </a:r>
-          </a:p>
-          <a:p>
-            <a:pPr lvl="1"/>
-            <a:r>
-              <a:rPr lang="en-US" dirty="0"/>
-              <a:t>Write “y” to any prompts</a:t>
-            </a:r>
-          </a:p>
-          <a:p>
-            <a:pPr lvl="1"/>
-            <a:endParaRPr lang="en-US" dirty="0"/>
-          </a:p>
-          <a:p>
-            <a:r>
-              <a:rPr lang="en-US" dirty="0"/>
-              <a:t>Open the “</a:t>
-            </a:r>
-            <a:r>
-              <a:rPr lang="en-US" dirty="0" err="1"/>
-              <a:t>intro_programming_in_r.Rmd</a:t>
-            </a:r>
-            <a:r>
-              <a:rPr lang="en-US" dirty="0"/>
-              <a:t>” file, which should pop up in the upper left quadrant of RStudio</a:t>
+              <a:t>A “computational_flow_cytometry.html” file is also available to open in your browser if you would like to see the expected output at each step: it is generated from the corresponding .Rmd file</a:t>
             </a:r>
           </a:p>
         </p:txBody>
@@ -5621,7 +5414,7 @@
               <a:pPr/>
               <a:t>18</a:t>
             </a:fld>
-            <a:endParaRPr lang="en-US"/>
+            <a:endParaRPr lang="en-US" dirty="0"/>
           </a:p>
         </p:txBody>
       </p:sp>
@@ -5759,6 +5552,13 @@
               <a:t>We offer collaboration opportunities to address research questions at no direct cost to the NIAID research community and collaborators</a:t>
             </a:r>
           </a:p>
+          <a:p>
+            <a:pPr lvl="1"/>
+            <a:r>
+              <a:rPr lang="en-US" sz="1800" b="1" dirty="0"/>
+              <a:t>Email: bioinformatics@niaid.nih.gov</a:t>
+            </a:r>
+          </a:p>
         </p:txBody>
       </p:sp>
       <p:sp>
@@ -5787,7 +5587,7 @@
               <a:pPr/>
               <a:t>2</a:t>
             </a:fld>
-            <a:endParaRPr lang="en-US"/>
+            <a:endParaRPr lang="en-US" dirty="0"/>
           </a:p>
         </p:txBody>
       </p:sp>
@@ -5987,7 +5787,7 @@
               <a:pPr/>
               <a:t>3</a:t>
             </a:fld>
-            <a:endParaRPr lang="en-US"/>
+            <a:endParaRPr lang="en-US" dirty="0"/>
           </a:p>
         </p:txBody>
       </p:sp>
@@ -6075,7 +5875,7 @@
               <a:pPr/>
               <a:t>4</a:t>
             </a:fld>
-            <a:endParaRPr lang="en-US"/>
+            <a:endParaRPr lang="en-US" dirty="0"/>
           </a:p>
         </p:txBody>
       </p:sp>
@@ -6339,22 +6139,13 @@
           <a:p>
             <a:pPr algn="l"/>
             <a:r>
-              <a:rPr lang="en-US" sz="675" dirty="0" err="1">
-                <a:solidFill>
-                  <a:srgbClr val="000000"/>
-                </a:solidFill>
-                <a:latin typeface="Segoe UI" panose="020B0502040204020203" pitchFamily="34" charset="0"/>
-              </a:rPr>
-              <a:t>Schmit</a:t>
-            </a:r>
-            <a:r>
               <a:rPr lang="en-US" sz="675" dirty="0">
                 <a:solidFill>
                   <a:srgbClr val="000000"/>
                 </a:solidFill>
                 <a:latin typeface="Segoe UI" panose="020B0502040204020203" pitchFamily="34" charset="0"/>
               </a:rPr>
-              <a:t>, T., Klomp, M. and Khan, M. (2020) "An Overview of Flow Cytometry: Its Principles and Applications in Allergic Disease Research", </a:t>
+              <a:t>Schmit, T., Klomp, M. and Khan, M. (2020) "An Overview of Flow Cytometry: Its Principles and Applications in Allergic Disease Research", </a:t>
             </a:r>
             <a:r>
               <a:rPr lang="en-US" sz="675" i="1" dirty="0">
@@ -6372,25 +6163,7 @@
                 </a:solidFill>
                 <a:latin typeface="Segoe UI" panose="020B0502040204020203" pitchFamily="34" charset="0"/>
               </a:rPr>
-              <a:t>, pp. 169-182. </a:t>
-            </a:r>
-            <a:r>
-              <a:rPr lang="en-US" sz="675" dirty="0" err="1">
-                <a:solidFill>
-                  <a:srgbClr val="000000"/>
-                </a:solidFill>
-                <a:latin typeface="Segoe UI" panose="020B0502040204020203" pitchFamily="34" charset="0"/>
-              </a:rPr>
-              <a:t>doi</a:t>
-            </a:r>
-            <a:r>
-              <a:rPr lang="en-US" sz="675" dirty="0">
-                <a:solidFill>
-                  <a:srgbClr val="000000"/>
-                </a:solidFill>
-                <a:latin typeface="Segoe UI" panose="020B0502040204020203" pitchFamily="34" charset="0"/>
-              </a:rPr>
-              <a:t>: 10.1007/978-1-0716-1001-5_13.</a:t>
+              <a:t>, pp. 169-182. doi: 10.1007/978-1-0716-1001-5_13.</a:t>
             </a:r>
           </a:p>
         </p:txBody>
@@ -6530,22 +6303,13 @@
           <a:p>
             <a:pPr algn="l"/>
             <a:r>
-              <a:rPr lang="en-US" sz="675" dirty="0" err="1">
-                <a:solidFill>
-                  <a:srgbClr val="000000"/>
-                </a:solidFill>
-                <a:latin typeface="Segoe UI" panose="020B0502040204020203" pitchFamily="34" charset="0"/>
-              </a:rPr>
-              <a:t>Schmit</a:t>
-            </a:r>
-            <a:r>
               <a:rPr lang="en-US" sz="675" dirty="0">
                 <a:solidFill>
                   <a:srgbClr val="000000"/>
                 </a:solidFill>
                 <a:latin typeface="Segoe UI" panose="020B0502040204020203" pitchFamily="34" charset="0"/>
               </a:rPr>
-              <a:t>, T., Klomp, M. and Khan, M. (2020) "An Overview of Flow Cytometry: Its Principles and Applications in Allergic Disease Research", </a:t>
+              <a:t>Schmit, T., Klomp, M. and Khan, M. (2020) "An Overview of Flow Cytometry: Its Principles and Applications in Allergic Disease Research", </a:t>
             </a:r>
             <a:r>
               <a:rPr lang="en-US" sz="675" i="1" dirty="0">
@@ -6563,25 +6327,7 @@
                 </a:solidFill>
                 <a:latin typeface="Segoe UI" panose="020B0502040204020203" pitchFamily="34" charset="0"/>
               </a:rPr>
-              <a:t>, pp. 169-182. </a:t>
-            </a:r>
-            <a:r>
-              <a:rPr lang="en-US" sz="675" dirty="0" err="1">
-                <a:solidFill>
-                  <a:srgbClr val="000000"/>
-                </a:solidFill>
-                <a:latin typeface="Segoe UI" panose="020B0502040204020203" pitchFamily="34" charset="0"/>
-              </a:rPr>
-              <a:t>doi</a:t>
-            </a:r>
-            <a:r>
-              <a:rPr lang="en-US" sz="675" dirty="0">
-                <a:solidFill>
-                  <a:srgbClr val="000000"/>
-                </a:solidFill>
-                <a:latin typeface="Segoe UI" panose="020B0502040204020203" pitchFamily="34" charset="0"/>
-              </a:rPr>
-              <a:t>: 10.1007/978-1-0716-1001-5_13.</a:t>
+              <a:t>, pp. 169-182. doi: 10.1007/978-1-0716-1001-5_13.</a:t>
             </a:r>
           </a:p>
         </p:txBody>
@@ -6729,7 +6475,7 @@
               <a:pPr/>
               <a:t>7</a:t>
             </a:fld>
-            <a:endParaRPr lang="en-US"/>
+            <a:endParaRPr lang="en-US" dirty="0"/>
           </a:p>
         </p:txBody>
       </p:sp>
@@ -6887,25 +6633,7 @@
                 </a:solidFill>
                 <a:latin typeface="Segoe UI" panose="020B0502040204020203" pitchFamily="34" charset="0"/>
               </a:rPr>
-              <a:t>Hahne, F. et al. (2009) "</a:t>
-            </a:r>
-            <a:r>
-              <a:rPr lang="en-US" sz="800" dirty="0" err="1">
-                <a:solidFill>
-                  <a:srgbClr val="000000"/>
-                </a:solidFill>
-                <a:latin typeface="Segoe UI" panose="020B0502040204020203" pitchFamily="34" charset="0"/>
-              </a:rPr>
-              <a:t>flowCore</a:t>
-            </a:r>
-            <a:r>
-              <a:rPr lang="en-US" sz="800" dirty="0">
-                <a:solidFill>
-                  <a:srgbClr val="000000"/>
-                </a:solidFill>
-                <a:latin typeface="Segoe UI" panose="020B0502040204020203" pitchFamily="34" charset="0"/>
-              </a:rPr>
-              <a:t>: a Bioconductor package for high throughput flow cytometry", </a:t>
+              <a:t>Hahne, F. et al. (2009) "flowCore: a Bioconductor package for high throughput flow cytometry", </a:t>
             </a:r>
             <a:r>
               <a:rPr lang="en-US" sz="800" i="1" dirty="0">
@@ -6923,25 +6651,7 @@
                 </a:solidFill>
                 <a:latin typeface="Segoe UI" panose="020B0502040204020203" pitchFamily="34" charset="0"/>
               </a:rPr>
-              <a:t>, 10(1). </a:t>
-            </a:r>
-            <a:r>
-              <a:rPr lang="en-US" sz="800" dirty="0" err="1">
-                <a:solidFill>
-                  <a:srgbClr val="000000"/>
-                </a:solidFill>
-                <a:latin typeface="Segoe UI" panose="020B0502040204020203" pitchFamily="34" charset="0"/>
-              </a:rPr>
-              <a:t>doi</a:t>
-            </a:r>
-            <a:r>
-              <a:rPr lang="en-US" sz="800" dirty="0">
-                <a:solidFill>
-                  <a:srgbClr val="000000"/>
-                </a:solidFill>
-                <a:latin typeface="Segoe UI" panose="020B0502040204020203" pitchFamily="34" charset="0"/>
-              </a:rPr>
-              <a:t>: 10.1186/1471-2105-10-106.</a:t>
+              <a:t>, 10(1). doi: 10.1186/1471-2105-10-106.</a:t>
             </a:r>
           </a:p>
           <a:p>
@@ -6955,22 +6665,13 @@
           </a:p>
           <a:p>
             <a:r>
-              <a:rPr lang="en-US" sz="800" dirty="0" err="1">
-                <a:solidFill>
-                  <a:srgbClr val="000000"/>
-                </a:solidFill>
-                <a:latin typeface="Segoe UI" panose="020B0502040204020203" pitchFamily="34" charset="0"/>
-              </a:rPr>
-              <a:t>Drakos</a:t>
-            </a:r>
-            <a:r>
               <a:rPr lang="en-US" sz="800" dirty="0">
                 <a:solidFill>
                   <a:srgbClr val="000000"/>
                 </a:solidFill>
                 <a:latin typeface="Segoe UI" panose="020B0502040204020203" pitchFamily="34" charset="0"/>
               </a:rPr>
-              <a:t>, J. et al. (2008) "A perspective for biomedical data integration: Design of databases for flow cytometry", </a:t>
+              <a:t>Drakos, J. et al. (2008) "A perspective for biomedical data integration: Design of databases for flow cytometry", </a:t>
             </a:r>
             <a:r>
               <a:rPr lang="en-US" sz="800" i="1" dirty="0">
@@ -6988,25 +6689,7 @@
                 </a:solidFill>
                 <a:latin typeface="Segoe UI" panose="020B0502040204020203" pitchFamily="34" charset="0"/>
               </a:rPr>
-              <a:t>, 9(1). </a:t>
-            </a:r>
-            <a:r>
-              <a:rPr lang="en-US" sz="800" dirty="0" err="1">
-                <a:solidFill>
-                  <a:srgbClr val="000000"/>
-                </a:solidFill>
-                <a:latin typeface="Segoe UI" panose="020B0502040204020203" pitchFamily="34" charset="0"/>
-              </a:rPr>
-              <a:t>doi</a:t>
-            </a:r>
-            <a:r>
-              <a:rPr lang="en-US" sz="800" dirty="0">
-                <a:solidFill>
-                  <a:srgbClr val="000000"/>
-                </a:solidFill>
-                <a:latin typeface="Segoe UI" panose="020B0502040204020203" pitchFamily="34" charset="0"/>
-              </a:rPr>
-              <a:t>: 10.1186/1471-2105-9-99.</a:t>
+              <a:t>, 9(1). doi: 10.1186/1471-2105-9-99.</a:t>
             </a:r>
           </a:p>
           <a:p>
@@ -7084,15 +6767,7 @@
             </a:r>
             <a:r>
               <a:rPr lang="en-US" sz="1050" dirty="0"/>
-              <a:t>optional segment </a:t>
-            </a:r>
-            <a:r>
-              <a:rPr lang="en-US" sz="1050" dirty="0" err="1"/>
-              <a:t>contiaining</a:t>
-            </a:r>
-            <a:r>
-              <a:rPr lang="en-US" sz="1050" dirty="0"/>
-              <a:t> results of downstream analysis </a:t>
+              <a:t>optional segment contiaining results of downstream analysis </a:t>
             </a:r>
             <a:endParaRPr lang="en-US" sz="1050" b="1" dirty="0"/>
           </a:p>

</xml_diff>

<commit_message>
Fix missing link on slide
</commit_message>
<xml_diff>
--- a/Introduction to Computational Flow Cytometry in R.pptx
+++ b/Introduction to Computational Flow Cytometry in R.pptx
@@ -247,7 +247,7 @@
           <a:p>
             <a:fld id="{20985C1D-71CD-40A7-90E6-2A509741901C}" type="datetimeFigureOut">
               <a:rPr lang="en-US" smtClean="0"/>
-              <a:t>3/13/2024</a:t>
+              <a:t>3/21/2024</a:t>
             </a:fld>
             <a:endParaRPr lang="en-US" dirty="0"/>
           </a:p>
@@ -413,7 +413,7 @@
             <a:fld id="{D39D1713-3CF6-4469-9746-34AB3FADFE84}" type="datetimeFigureOut">
               <a:rPr lang="en-US" smtClean="0"/>
               <a:pPr/>
-              <a:t>3/13/2024</a:t>
+              <a:t>3/21/2024</a:t>
             </a:fld>
             <a:endParaRPr lang="en-US" dirty="0"/>
           </a:p>
@@ -4622,7 +4622,7 @@
         <p:spPr/>
         <p:txBody>
           <a:bodyPr>
-            <a:normAutofit fontScale="85000" lnSpcReduction="20000"/>
+            <a:normAutofit fontScale="77500" lnSpcReduction="20000"/>
           </a:bodyPr>
           <a:lstStyle/>
           <a:p>
@@ -4669,11 +4669,18 @@
             <a:pPr lvl="1"/>
             <a:r>
               <a:rPr lang="en-US" dirty="0"/>
-              <a:t>Location of course materials:</a:t>
-            </a:r>
-          </a:p>
-          <a:p>
-            <a:pPr marL="342900" lvl="1" indent="0">
+              <a:t>Location of course materials: </a:t>
+            </a:r>
+            <a:r>
+              <a:rPr lang="en-US" dirty="0">
+                <a:hlinkClick r:id="rId4"/>
+              </a:rPr>
+              <a:t>https://github.com/niaid/computational.flow.cytometry</a:t>
+            </a:r>
+            <a:endParaRPr lang="en-US" dirty="0"/>
+          </a:p>
+          <a:p>
+            <a:pPr marL="228600" lvl="1" indent="0">
               <a:buNone/>
             </a:pPr>
             <a:endParaRPr lang="en-US" dirty="0"/>
@@ -4692,7 +4699,7 @@
             </a:r>
             <a:r>
               <a:rPr lang="en-US" dirty="0">
-                <a:hlinkClick r:id="rId4"/>
+                <a:hlinkClick r:id="rId5"/>
               </a:rPr>
               <a:t>https://inside.niaid.nih.gov/it-equipment/installing-scientific-software-using-software-center</a:t>
             </a:r>
@@ -4706,7 +4713,7 @@
             </a:r>
             <a:r>
               <a:rPr lang="en-US" dirty="0">
-                <a:hlinkClick r:id="rId5"/>
+                <a:hlinkClick r:id="rId6"/>
               </a:rPr>
               <a:t>https://inside.niaid.nih.gov/it-equipment/installing-scientific-software-mac-self-service</a:t>
             </a:r>
@@ -7794,6 +7801,150 @@
 </file>
 
 <file path=customXml/item1.xml><?xml version="1.0" encoding="utf-8"?>
+<?mso-contentType ?>
+<FormTemplates xmlns="http://schemas.microsoft.com/sharepoint/v3/contenttype/forms">
+  <Display>DocumentLibraryForm</Display>
+  <Edit>DocumentLibraryForm</Edit>
+  <New>DocumentLibraryForm</New>
+</FormTemplates>
+</file>
+
+<file path=customXml/item2.xml><?xml version="1.0" encoding="utf-8"?>
+<p:properties xmlns:p="http://schemas.microsoft.com/office/2006/metadata/properties" xmlns:xsi="http://www.w3.org/2001/XMLSchema-instance" xmlns:pc="http://schemas.microsoft.com/office/infopath/2007/PartnerControls">
+  <documentManagement>
+    <RoleWriter xmlns="39ebf7f1-f535-4821-a5cc-61fe1af6aceb">
+      <UserInfo>
+        <DisplayName/>
+        <AccountId xsi:nil="true"/>
+        <AccountType/>
+      </UserInfo>
+    </RoleWriter>
+    <RoleSME xmlns="39ebf7f1-f535-4821-a5cc-61fe1af6aceb">
+      <UserInfo>
+        <DisplayName/>
+        <AccountId xsi:nil="true"/>
+        <AccountType/>
+      </UserInfo>
+    </RoleSME>
+    <n353f4d4a57f4c5e861994e7b83feb70 xmlns="39ebf7f1-f535-4821-a5cc-61fe1af6aceb">
+      <Terms xmlns="http://schemas.microsoft.com/office/infopath/2007/PartnerControls">
+        <TermInfo xmlns="http://schemas.microsoft.com/office/infopath/2007/PartnerControls">
+          <TermName xmlns="http://schemas.microsoft.com/office/infopath/2007/PartnerControls">Samples, Examples, or Templates</TermName>
+          <TermId xmlns="http://schemas.microsoft.com/office/infopath/2007/PartnerControls">3bbb578f-d471-4cbf-8483-3dc6fbf7274b</TermId>
+        </TermInfo>
+      </Terms>
+    </n353f4d4a57f4c5e861994e7b83feb70>
+    <TaxCatchAll xmlns="39ebf7f1-f535-4821-a5cc-61fe1af6aceb">
+      <Value>22</Value>
+      <Value>43</Value>
+      <Value>640</Value>
+      <Value>18</Value>
+      <Value>269</Value>
+      <Value>64</Value>
+      <Value>74</Value>
+      <Value>26</Value>
+    </TaxCatchAll>
+    <RoleGroupEmail xmlns="39ebf7f1-f535-4821-a5cc-61fe1af6aceb">
+      <Url xsi:nil="true"/>
+      <Description xsi:nil="true"/>
+    </RoleGroupEmail>
+    <RoleOwner xmlns="39ebf7f1-f535-4821-a5cc-61fe1af6aceb">
+      <UserInfo>
+        <DisplayName>NIH\billetc</DisplayName>
+        <AccountId>85</AccountId>
+        <AccountType/>
+      </UserInfo>
+    </RoleOwner>
+    <RoleUberOwner xmlns="39ebf7f1-f535-4821-a5cc-61fe1af6aceb">
+      <UserInfo>
+        <DisplayName>NIH\jmcgowan</DisplayName>
+        <AccountId>23</AccountId>
+        <AccountType/>
+      </UserInfo>
+    </RoleUberOwner>
+    <g8985b07c95247c28b321b638e73bcb3 xmlns="39ebf7f1-f535-4821-a5cc-61fe1af6aceb">
+      <Terms xmlns="http://schemas.microsoft.com/office/infopath/2007/PartnerControls">
+        <TermInfo xmlns="http://schemas.microsoft.com/office/infopath/2007/PartnerControls">
+          <TermName xmlns="http://schemas.microsoft.com/office/infopath/2007/PartnerControls">Branding</TermName>
+          <TermId xmlns="http://schemas.microsoft.com/office/infopath/2007/PartnerControls">0a19a9bf-d866-4d14-b94b-6fc7acaff3af</TermId>
+        </TermInfo>
+      </Terms>
+    </g8985b07c95247c28b321b638e73bcb3>
+    <PublishingExpirationDate xmlns="http://schemas.microsoft.com/sharepoint/v3" xsi:nil="true"/>
+    <PublishingStartDate xmlns="http://schemas.microsoft.com/sharepoint/v3" xsi:nil="true"/>
+    <Archive xmlns="39ebf7f1-f535-4821-a5cc-61fe1af6aceb">false</Archive>
+    <RoleCoordinator xmlns="39ebf7f1-f535-4821-a5cc-61fe1af6aceb">
+      <UserInfo>
+        <DisplayName>Litsinger, Alice (NIH/NIAID) [E]</DisplayName>
+        <AccountId>20</AccountId>
+        <AccountType/>
+      </UserInfo>
+    </RoleCoordinator>
+    <RoleCurator xmlns="39ebf7f1-f535-4821-a5cc-61fe1af6aceb">
+      <UserInfo>
+        <DisplayName/>
+        <AccountId xsi:nil="true"/>
+        <AccountType/>
+      </UserInfo>
+    </RoleCurator>
+    <RoleEditor xmlns="39ebf7f1-f535-4821-a5cc-61fe1af6aceb">
+      <UserInfo>
+        <DisplayName/>
+        <AccountId xsi:nil="true"/>
+        <AccountType/>
+      </UserInfo>
+    </RoleEditor>
+    <a408bdf5d9ca430e9a60f99c9f9e3e05 xmlns="39ebf7f1-f535-4821-a5cc-61fe1af6aceb">
+      <Terms xmlns="http://schemas.microsoft.com/office/infopath/2007/PartnerControls">
+        <TermInfo xmlns="http://schemas.microsoft.com/office/infopath/2007/PartnerControls">
+          <TermName xmlns="http://schemas.microsoft.com/office/infopath/2007/PartnerControls">Communications</TermName>
+          <TermId xmlns="http://schemas.microsoft.com/office/infopath/2007/PartnerControls">300e3106-f82c-430d-a82e-a4820231a3cb</TermId>
+        </TermInfo>
+        <TermInfo xmlns="http://schemas.microsoft.com/office/infopath/2007/PartnerControls">
+          <TermName xmlns="http://schemas.microsoft.com/office/infopath/2007/PartnerControls">Branding</TermName>
+          <TermId xmlns="http://schemas.microsoft.com/office/infopath/2007/PartnerControls">0a19a9bf-d866-4d14-b94b-6fc7acaff3af</TermId>
+        </TermInfo>
+      </Terms>
+    </a408bdf5d9ca430e9a60f99c9f9e3e05>
+    <m5617882f6b141a4977c0927fb9b51d3 xmlns="39ebf7f1-f535-4821-a5cc-61fe1af6aceb">
+      <Terms xmlns="http://schemas.microsoft.com/office/infopath/2007/PartnerControls">
+        <TermInfo xmlns="http://schemas.microsoft.com/office/infopath/2007/PartnerControls">
+          <TermName xmlns="http://schemas.microsoft.com/office/infopath/2007/PartnerControls">NIAID</TermName>
+          <TermId xmlns="http://schemas.microsoft.com/office/infopath/2007/PartnerControls">25ff8cae-b04a-4344-be0d-380d132f7d63</TermId>
+        </TermInfo>
+        <TermInfo xmlns="http://schemas.microsoft.com/office/infopath/2007/PartnerControls">
+          <TermName xmlns="http://schemas.microsoft.com/office/infopath/2007/PartnerControls">OD</TermName>
+          <TermId xmlns="http://schemas.microsoft.com/office/infopath/2007/PartnerControls">33022f6f-2c30-403d-8bae-29b269b4a979</TermId>
+        </TermInfo>
+        <TermInfo xmlns="http://schemas.microsoft.com/office/infopath/2007/PartnerControls">
+          <TermName xmlns="http://schemas.microsoft.com/office/infopath/2007/PartnerControls">OSMO</TermName>
+          <TermId xmlns="http://schemas.microsoft.com/office/infopath/2007/PartnerControls">1c36b03e-f7e1-4f6e-8f1d-a611467f63af</TermId>
+        </TermInfo>
+        <TermInfo xmlns="http://schemas.microsoft.com/office/infopath/2007/PartnerControls">
+          <TermName xmlns="http://schemas.microsoft.com/office/infopath/2007/PartnerControls">OCGR</TermName>
+          <TermId xmlns="http://schemas.microsoft.com/office/infopath/2007/PartnerControls">904ffdf7-2ad1-4251-b168-11ee1dd39830</TermId>
+        </TermInfo>
+        <TermInfo xmlns="http://schemas.microsoft.com/office/infopath/2007/PartnerControls">
+          <TermName xmlns="http://schemas.microsoft.com/office/infopath/2007/PartnerControls">NMWPB</TermName>
+          <TermId xmlns="http://schemas.microsoft.com/office/infopath/2007/PartnerControls">e4eabdaa-85ea-416b-a435-b6eb8f3442e3</TermId>
+        </TermInfo>
+      </Terms>
+    </m5617882f6b141a4977c0927fb9b51d3>
+    <b94d299a2e6147c286350c3f8eb884b0 xmlns="39ebf7f1-f535-4821-a5cc-61fe1af6aceb">
+      <Terms xmlns="http://schemas.microsoft.com/office/infopath/2007/PartnerControls">
+        <TermInfo xmlns="http://schemas.microsoft.com/office/infopath/2007/PartnerControls">
+          <TermName xmlns="http://schemas.microsoft.com/office/infopath/2007/PartnerControls">NMWPB</TermName>
+          <TermId xmlns="http://schemas.microsoft.com/office/infopath/2007/PartnerControls">e4eabdaa-85ea-416b-a435-b6eb8f3442e3</TermId>
+        </TermInfo>
+      </Terms>
+    </b94d299a2e6147c286350c3f8eb884b0>
+    <NIAIDLongTermArchiveDate xmlns="39ebf7f1-f535-4821-a5cc-61fe1af6aceb" xsi:nil="true"/>
+    <NIAIDLongTermArchive xmlns="39ebf7f1-f535-4821-a5cc-61fe1af6aceb" xsi:nil="true"/>
+  </documentManagement>
+</p:properties>
+</file>
+
+<file path=customXml/item3.xml><?xml version="1.0" encoding="utf-8"?>
 <ct:contentTypeSchema xmlns:ct="http://schemas.microsoft.com/office/2006/metadata/contentType" xmlns:ma="http://schemas.microsoft.com/office/2006/metadata/properties/metaAttributes" ct:_="" ma:_="" ma:contentTypeName="Document" ma:contentTypeID="0x010100E25FD98D16A17148B07EBAAE179FDEB2" ma:contentTypeVersion="3" ma:contentTypeDescription="Create a new document." ma:contentTypeScope="" ma:versionID="06bba31ecabb5c09a3d4c7b6dbecacae">
   <xsd:schema xmlns:xsd="http://www.w3.org/2001/XMLSchema" xmlns:xs="http://www.w3.org/2001/XMLSchema" xmlns:p="http://schemas.microsoft.com/office/2006/metadata/properties" xmlns:ns1="http://schemas.microsoft.com/sharepoint/v3" xmlns:ns4="39ebf7f1-f535-4821-a5cc-61fe1af6aceb" targetNamespace="http://schemas.microsoft.com/office/2006/metadata/properties" ma:root="true" ma:fieldsID="3e73f49551fe26342b0852ac074a1df8" ns1:_="" ns4:_="">
     <xsd:import namespace="http://schemas.microsoft.com/sharepoint/v3"/>
@@ -8170,165 +8321,10 @@
 </ct:contentTypeSchema>
 </file>
 
-<file path=customXml/item2.xml><?xml version="1.0" encoding="utf-8"?>
-<p:properties xmlns:p="http://schemas.microsoft.com/office/2006/metadata/properties" xmlns:xsi="http://www.w3.org/2001/XMLSchema-instance" xmlns:pc="http://schemas.microsoft.com/office/infopath/2007/PartnerControls">
-  <documentManagement>
-    <RoleWriter xmlns="39ebf7f1-f535-4821-a5cc-61fe1af6aceb">
-      <UserInfo>
-        <DisplayName/>
-        <AccountId xsi:nil="true"/>
-        <AccountType/>
-      </UserInfo>
-    </RoleWriter>
-    <RoleSME xmlns="39ebf7f1-f535-4821-a5cc-61fe1af6aceb">
-      <UserInfo>
-        <DisplayName/>
-        <AccountId xsi:nil="true"/>
-        <AccountType/>
-      </UserInfo>
-    </RoleSME>
-    <n353f4d4a57f4c5e861994e7b83feb70 xmlns="39ebf7f1-f535-4821-a5cc-61fe1af6aceb">
-      <Terms xmlns="http://schemas.microsoft.com/office/infopath/2007/PartnerControls">
-        <TermInfo xmlns="http://schemas.microsoft.com/office/infopath/2007/PartnerControls">
-          <TermName xmlns="http://schemas.microsoft.com/office/infopath/2007/PartnerControls">Samples, Examples, or Templates</TermName>
-          <TermId xmlns="http://schemas.microsoft.com/office/infopath/2007/PartnerControls">3bbb578f-d471-4cbf-8483-3dc6fbf7274b</TermId>
-        </TermInfo>
-      </Terms>
-    </n353f4d4a57f4c5e861994e7b83feb70>
-    <TaxCatchAll xmlns="39ebf7f1-f535-4821-a5cc-61fe1af6aceb">
-      <Value>22</Value>
-      <Value>43</Value>
-      <Value>640</Value>
-      <Value>18</Value>
-      <Value>269</Value>
-      <Value>64</Value>
-      <Value>74</Value>
-      <Value>26</Value>
-    </TaxCatchAll>
-    <RoleGroupEmail xmlns="39ebf7f1-f535-4821-a5cc-61fe1af6aceb">
-      <Url xsi:nil="true"/>
-      <Description xsi:nil="true"/>
-    </RoleGroupEmail>
-    <RoleOwner xmlns="39ebf7f1-f535-4821-a5cc-61fe1af6aceb">
-      <UserInfo>
-        <DisplayName>NIH\billetc</DisplayName>
-        <AccountId>85</AccountId>
-        <AccountType/>
-      </UserInfo>
-    </RoleOwner>
-    <RoleUberOwner xmlns="39ebf7f1-f535-4821-a5cc-61fe1af6aceb">
-      <UserInfo>
-        <DisplayName>NIH\jmcgowan</DisplayName>
-        <AccountId>23</AccountId>
-        <AccountType/>
-      </UserInfo>
-    </RoleUberOwner>
-    <g8985b07c95247c28b321b638e73bcb3 xmlns="39ebf7f1-f535-4821-a5cc-61fe1af6aceb">
-      <Terms xmlns="http://schemas.microsoft.com/office/infopath/2007/PartnerControls">
-        <TermInfo xmlns="http://schemas.microsoft.com/office/infopath/2007/PartnerControls">
-          <TermName xmlns="http://schemas.microsoft.com/office/infopath/2007/PartnerControls">Branding</TermName>
-          <TermId xmlns="http://schemas.microsoft.com/office/infopath/2007/PartnerControls">0a19a9bf-d866-4d14-b94b-6fc7acaff3af</TermId>
-        </TermInfo>
-      </Terms>
-    </g8985b07c95247c28b321b638e73bcb3>
-    <PublishingExpirationDate xmlns="http://schemas.microsoft.com/sharepoint/v3" xsi:nil="true"/>
-    <PublishingStartDate xmlns="http://schemas.microsoft.com/sharepoint/v3" xsi:nil="true"/>
-    <Archive xmlns="39ebf7f1-f535-4821-a5cc-61fe1af6aceb">false</Archive>
-    <RoleCoordinator xmlns="39ebf7f1-f535-4821-a5cc-61fe1af6aceb">
-      <UserInfo>
-        <DisplayName>Litsinger, Alice (NIH/NIAID) [E]</DisplayName>
-        <AccountId>20</AccountId>
-        <AccountType/>
-      </UserInfo>
-    </RoleCoordinator>
-    <RoleCurator xmlns="39ebf7f1-f535-4821-a5cc-61fe1af6aceb">
-      <UserInfo>
-        <DisplayName/>
-        <AccountId xsi:nil="true"/>
-        <AccountType/>
-      </UserInfo>
-    </RoleCurator>
-    <RoleEditor xmlns="39ebf7f1-f535-4821-a5cc-61fe1af6aceb">
-      <UserInfo>
-        <DisplayName/>
-        <AccountId xsi:nil="true"/>
-        <AccountType/>
-      </UserInfo>
-    </RoleEditor>
-    <a408bdf5d9ca430e9a60f99c9f9e3e05 xmlns="39ebf7f1-f535-4821-a5cc-61fe1af6aceb">
-      <Terms xmlns="http://schemas.microsoft.com/office/infopath/2007/PartnerControls">
-        <TermInfo xmlns="http://schemas.microsoft.com/office/infopath/2007/PartnerControls">
-          <TermName xmlns="http://schemas.microsoft.com/office/infopath/2007/PartnerControls">Communications</TermName>
-          <TermId xmlns="http://schemas.microsoft.com/office/infopath/2007/PartnerControls">300e3106-f82c-430d-a82e-a4820231a3cb</TermId>
-        </TermInfo>
-        <TermInfo xmlns="http://schemas.microsoft.com/office/infopath/2007/PartnerControls">
-          <TermName xmlns="http://schemas.microsoft.com/office/infopath/2007/PartnerControls">Branding</TermName>
-          <TermId xmlns="http://schemas.microsoft.com/office/infopath/2007/PartnerControls">0a19a9bf-d866-4d14-b94b-6fc7acaff3af</TermId>
-        </TermInfo>
-      </Terms>
-    </a408bdf5d9ca430e9a60f99c9f9e3e05>
-    <m5617882f6b141a4977c0927fb9b51d3 xmlns="39ebf7f1-f535-4821-a5cc-61fe1af6aceb">
-      <Terms xmlns="http://schemas.microsoft.com/office/infopath/2007/PartnerControls">
-        <TermInfo xmlns="http://schemas.microsoft.com/office/infopath/2007/PartnerControls">
-          <TermName xmlns="http://schemas.microsoft.com/office/infopath/2007/PartnerControls">NIAID</TermName>
-          <TermId xmlns="http://schemas.microsoft.com/office/infopath/2007/PartnerControls">25ff8cae-b04a-4344-be0d-380d132f7d63</TermId>
-        </TermInfo>
-        <TermInfo xmlns="http://schemas.microsoft.com/office/infopath/2007/PartnerControls">
-          <TermName xmlns="http://schemas.microsoft.com/office/infopath/2007/PartnerControls">OD</TermName>
-          <TermId xmlns="http://schemas.microsoft.com/office/infopath/2007/PartnerControls">33022f6f-2c30-403d-8bae-29b269b4a979</TermId>
-        </TermInfo>
-        <TermInfo xmlns="http://schemas.microsoft.com/office/infopath/2007/PartnerControls">
-          <TermName xmlns="http://schemas.microsoft.com/office/infopath/2007/PartnerControls">OSMO</TermName>
-          <TermId xmlns="http://schemas.microsoft.com/office/infopath/2007/PartnerControls">1c36b03e-f7e1-4f6e-8f1d-a611467f63af</TermId>
-        </TermInfo>
-        <TermInfo xmlns="http://schemas.microsoft.com/office/infopath/2007/PartnerControls">
-          <TermName xmlns="http://schemas.microsoft.com/office/infopath/2007/PartnerControls">OCGR</TermName>
-          <TermId xmlns="http://schemas.microsoft.com/office/infopath/2007/PartnerControls">904ffdf7-2ad1-4251-b168-11ee1dd39830</TermId>
-        </TermInfo>
-        <TermInfo xmlns="http://schemas.microsoft.com/office/infopath/2007/PartnerControls">
-          <TermName xmlns="http://schemas.microsoft.com/office/infopath/2007/PartnerControls">NMWPB</TermName>
-          <TermId xmlns="http://schemas.microsoft.com/office/infopath/2007/PartnerControls">e4eabdaa-85ea-416b-a435-b6eb8f3442e3</TermId>
-        </TermInfo>
-      </Terms>
-    </m5617882f6b141a4977c0927fb9b51d3>
-    <b94d299a2e6147c286350c3f8eb884b0 xmlns="39ebf7f1-f535-4821-a5cc-61fe1af6aceb">
-      <Terms xmlns="http://schemas.microsoft.com/office/infopath/2007/PartnerControls">
-        <TermInfo xmlns="http://schemas.microsoft.com/office/infopath/2007/PartnerControls">
-          <TermName xmlns="http://schemas.microsoft.com/office/infopath/2007/PartnerControls">NMWPB</TermName>
-          <TermId xmlns="http://schemas.microsoft.com/office/infopath/2007/PartnerControls">e4eabdaa-85ea-416b-a435-b6eb8f3442e3</TermId>
-        </TermInfo>
-      </Terms>
-    </b94d299a2e6147c286350c3f8eb884b0>
-    <NIAIDLongTermArchiveDate xmlns="39ebf7f1-f535-4821-a5cc-61fe1af6aceb" xsi:nil="true"/>
-    <NIAIDLongTermArchive xmlns="39ebf7f1-f535-4821-a5cc-61fe1af6aceb" xsi:nil="true"/>
-  </documentManagement>
-</p:properties>
-</file>
-
-<file path=customXml/item3.xml><?xml version="1.0" encoding="utf-8"?>
-<?mso-contentType ?>
-<FormTemplates xmlns="http://schemas.microsoft.com/sharepoint/v3/contenttype/forms">
-  <Display>DocumentLibraryForm</Display>
-  <Edit>DocumentLibraryForm</Edit>
-  <New>DocumentLibraryForm</New>
-</FormTemplates>
-</file>
-
 <file path=customXml/itemProps1.xml><?xml version="1.0" encoding="utf-8"?>
-<ds:datastoreItem xmlns:ds="http://schemas.openxmlformats.org/officeDocument/2006/customXml" ds:itemID="{8D403BF1-5137-4542-B310-1CEBCE7570DC}">
+<ds:datastoreItem xmlns:ds="http://schemas.openxmlformats.org/officeDocument/2006/customXml" ds:itemID="{72CC2083-23A5-4920-AE6E-69B2A8C708B5}">
   <ds:schemaRefs>
-    <ds:schemaRef ds:uri="http://schemas.microsoft.com/office/2006/metadata/contentType"/>
-    <ds:schemaRef ds:uri="http://schemas.microsoft.com/office/2006/metadata/properties/metaAttributes"/>
-    <ds:schemaRef ds:uri="http://www.w3.org/2001/XMLSchema"/>
-    <ds:schemaRef ds:uri="http://schemas.microsoft.com/office/2006/metadata/properties"/>
-    <ds:schemaRef ds:uri="http://schemas.microsoft.com/sharepoint/v3"/>
-    <ds:schemaRef ds:uri="39ebf7f1-f535-4821-a5cc-61fe1af6aceb"/>
-    <ds:schemaRef ds:uri="http://schemas.microsoft.com/office/2006/documentManagement/types"/>
-    <ds:schemaRef ds:uri="http://schemas.microsoft.com/office/infopath/2007/PartnerControls"/>
-    <ds:schemaRef ds:uri="http://schemas.openxmlformats.org/package/2006/metadata/core-properties"/>
-    <ds:schemaRef ds:uri="http://purl.org/dc/elements/1.1/"/>
-    <ds:schemaRef ds:uri="http://purl.org/dc/terms/"/>
-    <ds:schemaRef ds:uri="http://schemas.microsoft.com/internal/obd"/>
+    <ds:schemaRef ds:uri="http://schemas.microsoft.com/sharepoint/v3/contenttype/forms"/>
   </ds:schemaRefs>
 </ds:datastoreItem>
 </file>
@@ -8351,9 +8347,20 @@
 </file>
 
 <file path=customXml/itemProps3.xml><?xml version="1.0" encoding="utf-8"?>
-<ds:datastoreItem xmlns:ds="http://schemas.openxmlformats.org/officeDocument/2006/customXml" ds:itemID="{72CC2083-23A5-4920-AE6E-69B2A8C708B5}">
+<ds:datastoreItem xmlns:ds="http://schemas.openxmlformats.org/officeDocument/2006/customXml" ds:itemID="{8D403BF1-5137-4542-B310-1CEBCE7570DC}">
   <ds:schemaRefs>
-    <ds:schemaRef ds:uri="http://schemas.microsoft.com/sharepoint/v3/contenttype/forms"/>
+    <ds:schemaRef ds:uri="http://schemas.microsoft.com/office/2006/metadata/contentType"/>
+    <ds:schemaRef ds:uri="http://schemas.microsoft.com/office/2006/metadata/properties/metaAttributes"/>
+    <ds:schemaRef ds:uri="http://www.w3.org/2001/XMLSchema"/>
+    <ds:schemaRef ds:uri="http://schemas.microsoft.com/office/2006/metadata/properties"/>
+    <ds:schemaRef ds:uri="http://schemas.microsoft.com/sharepoint/v3"/>
+    <ds:schemaRef ds:uri="39ebf7f1-f535-4821-a5cc-61fe1af6aceb"/>
+    <ds:schemaRef ds:uri="http://schemas.microsoft.com/office/2006/documentManagement/types"/>
+    <ds:schemaRef ds:uri="http://schemas.microsoft.com/office/infopath/2007/PartnerControls"/>
+    <ds:schemaRef ds:uri="http://schemas.openxmlformats.org/package/2006/metadata/core-properties"/>
+    <ds:schemaRef ds:uri="http://purl.org/dc/elements/1.1/"/>
+    <ds:schemaRef ds:uri="http://purl.org/dc/terms/"/>
+    <ds:schemaRef ds:uri="http://schemas.microsoft.com/internal/obd"/>
   </ds:schemaRefs>
 </ds:datastoreItem>
 </file>
</xml_diff>